<commit_message>
Updated last slide of presentation
</commit_message>
<xml_diff>
--- a/Grafosppt.pptx
+++ b/Grafosppt.pptx
@@ -276,7 +276,7 @@
           <a:p>
             <a:fld id="{44FE7822-D642-2C4E-ACB6-FF42C4938972}" type="datetimeFigureOut">
               <a:rPr lang="en-PT" smtClean="0"/>
-              <a:t>01/30/2022</a:t>
+              <a:t>30/01/2022</a:t>
             </a:fld>
             <a:endParaRPr lang="en-PT"/>
           </a:p>
@@ -476,7 +476,7 @@
           <a:p>
             <a:fld id="{44FE7822-D642-2C4E-ACB6-FF42C4938972}" type="datetimeFigureOut">
               <a:rPr lang="en-PT" smtClean="0"/>
-              <a:t>01/30/2022</a:t>
+              <a:t>30/01/2022</a:t>
             </a:fld>
             <a:endParaRPr lang="en-PT"/>
           </a:p>
@@ -686,7 +686,7 @@
           <a:p>
             <a:fld id="{44FE7822-D642-2C4E-ACB6-FF42C4938972}" type="datetimeFigureOut">
               <a:rPr lang="en-PT" smtClean="0"/>
-              <a:t>01/30/2022</a:t>
+              <a:t>30/01/2022</a:t>
             </a:fld>
             <a:endParaRPr lang="en-PT"/>
           </a:p>
@@ -886,7 +886,7 @@
           <a:p>
             <a:fld id="{44FE7822-D642-2C4E-ACB6-FF42C4938972}" type="datetimeFigureOut">
               <a:rPr lang="en-PT" smtClean="0"/>
-              <a:t>01/30/2022</a:t>
+              <a:t>30/01/2022</a:t>
             </a:fld>
             <a:endParaRPr lang="en-PT"/>
           </a:p>
@@ -1162,7 +1162,7 @@
           <a:p>
             <a:fld id="{44FE7822-D642-2C4E-ACB6-FF42C4938972}" type="datetimeFigureOut">
               <a:rPr lang="en-PT" smtClean="0"/>
-              <a:t>01/30/2022</a:t>
+              <a:t>30/01/2022</a:t>
             </a:fld>
             <a:endParaRPr lang="en-PT"/>
           </a:p>
@@ -1430,7 +1430,7 @@
           <a:p>
             <a:fld id="{44FE7822-D642-2C4E-ACB6-FF42C4938972}" type="datetimeFigureOut">
               <a:rPr lang="en-PT" smtClean="0"/>
-              <a:t>01/30/2022</a:t>
+              <a:t>30/01/2022</a:t>
             </a:fld>
             <a:endParaRPr lang="en-PT"/>
           </a:p>
@@ -1845,7 +1845,7 @@
           <a:p>
             <a:fld id="{44FE7822-D642-2C4E-ACB6-FF42C4938972}" type="datetimeFigureOut">
               <a:rPr lang="en-PT" smtClean="0"/>
-              <a:t>01/30/2022</a:t>
+              <a:t>30/01/2022</a:t>
             </a:fld>
             <a:endParaRPr lang="en-PT"/>
           </a:p>
@@ -1987,7 +1987,7 @@
           <a:p>
             <a:fld id="{44FE7822-D642-2C4E-ACB6-FF42C4938972}" type="datetimeFigureOut">
               <a:rPr lang="en-PT" smtClean="0"/>
-              <a:t>01/30/2022</a:t>
+              <a:t>30/01/2022</a:t>
             </a:fld>
             <a:endParaRPr lang="en-PT"/>
           </a:p>
@@ -2100,7 +2100,7 @@
           <a:p>
             <a:fld id="{44FE7822-D642-2C4E-ACB6-FF42C4938972}" type="datetimeFigureOut">
               <a:rPr lang="en-PT" smtClean="0"/>
-              <a:t>01/30/2022</a:t>
+              <a:t>30/01/2022</a:t>
             </a:fld>
             <a:endParaRPr lang="en-PT"/>
           </a:p>
@@ -2413,7 +2413,7 @@
           <a:p>
             <a:fld id="{44FE7822-D642-2C4E-ACB6-FF42C4938972}" type="datetimeFigureOut">
               <a:rPr lang="en-PT" smtClean="0"/>
-              <a:t>01/30/2022</a:t>
+              <a:t>30/01/2022</a:t>
             </a:fld>
             <a:endParaRPr lang="en-PT"/>
           </a:p>
@@ -2702,7 +2702,7 @@
           <a:p>
             <a:fld id="{44FE7822-D642-2C4E-ACB6-FF42C4938972}" type="datetimeFigureOut">
               <a:rPr lang="en-PT" smtClean="0"/>
-              <a:t>01/30/2022</a:t>
+              <a:t>30/01/2022</a:t>
             </a:fld>
             <a:endParaRPr lang="en-PT"/>
           </a:p>
@@ -2945,7 +2945,7 @@
           <a:p>
             <a:fld id="{44FE7822-D642-2C4E-ACB6-FF42C4938972}" type="datetimeFigureOut">
               <a:rPr lang="en-PT" smtClean="0"/>
-              <a:t>01/30/2022</a:t>
+              <a:t>30/01/2022</a:t>
             </a:fld>
             <a:endParaRPr lang="en-PT"/>
           </a:p>
@@ -14528,7 +14528,7 @@
             </a:pPr>
             <a:r>
               <a:rPr lang="pt-PT" sz="2200" dirty="0"/>
-              <a:t>Alexandre Correia – Leitura de dados e algoritmos em grafos</a:t>
+              <a:t>Alexandre Correia – Algoritmos em grafos</a:t>
             </a:r>
           </a:p>
           <a:p>
@@ -14538,7 +14538,7 @@
             </a:pPr>
             <a:r>
               <a:rPr lang="pt-PT" sz="2200" dirty="0"/>
-              <a:t>Henrique Silva – </a:t>
+              <a:t>Henrique Silva – Leitura de dados</a:t>
             </a:r>
           </a:p>
           <a:p>
@@ -14548,8 +14548,13 @@
             </a:pPr>
             <a:r>
               <a:rPr lang="pt-PT" sz="2200" dirty="0"/>
-              <a:t>Tiago Branquinho – Apresentação e Menu</a:t>
-            </a:r>
+              <a:t>Tiago </a:t>
+            </a:r>
+            <a:r>
+              <a:rPr lang="pt-PT" sz="2200"/>
+              <a:t>Branquinho – Menu</a:t>
+            </a:r>
+            <a:endParaRPr lang="pt-PT" sz="2200" dirty="0"/>
           </a:p>
         </p:txBody>
       </p:sp>

</xml_diff>